<commit_message>
Updated fields and exported as pdf file
</commit_message>
<xml_diff>
--- a/Grow with Sansel.pptx
+++ b/Grow with Sansel.pptx
@@ -4247,11 +4247,14 @@
           <a:bodyPr/>
           <a:lstStyle/>
           <a:p>
+            <a:pPr marL="0" indent="0">
+              <a:buNone/>
+            </a:pPr>
             <a:r>
               <a:rPr lang="en-US" dirty="0">
                 <a:latin typeface="Abadi" panose="020B0604020104020204" pitchFamily="34" charset="0"/>
               </a:rPr>
-              <a:t>Will collaborate at:</a:t>
+              <a:t> Sansel Tech Group:</a:t>
             </a:r>
           </a:p>
           <a:p>
@@ -4304,6 +4307,12 @@
           </a:p>
           <a:p>
             <a:r>
+              <a:rPr lang="en-US" dirty="0">
+                <a:latin typeface="Abadi" panose="020B0604020104020204" pitchFamily="34" charset="0"/>
+              </a:rPr>
+              <a:t>Sansel Tech </a:t>
+            </a:r>
+            <a:r>
               <a:rPr lang="en-IN" dirty="0">
                 <a:latin typeface="Abadi" panose="020B0604020104020204" pitchFamily="34" charset="0"/>
               </a:rPr>
@@ -4363,7 +4372,7 @@
               <a:rPr lang="en-IN" dirty="0">
                 <a:latin typeface="Abadi" panose="020B0604020104020204" pitchFamily="34" charset="0"/>
               </a:rPr>
-              <a:t>Sansel’s official repository:</a:t>
+              <a:t>Sansel GitHub repository:</a:t>
             </a:r>
           </a:p>
           <a:p>
@@ -4490,7 +4499,15 @@
                 <a:ea typeface="+mj-ea"/>
                 <a:cs typeface="Aharoni" panose="02010803020104030203" pitchFamily="2" charset="-79"/>
               </a:rPr>
-              <a:t>All  the best.</a:t>
+              <a:t>All the </a:t>
+            </a:r>
+            <a:r>
+              <a:rPr lang="en-US" sz="4500" spc="-50" dirty="0">
+                <a:latin typeface="Aharoni" panose="02010803020104030203" pitchFamily="2" charset="-79"/>
+                <a:ea typeface="+mj-ea"/>
+                <a:cs typeface="Aharoni" panose="02010803020104030203" pitchFamily="2" charset="-79"/>
+              </a:rPr>
+              <a:t>best.</a:t>
             </a:r>
             <a:endParaRPr lang="en-IN" sz="4500" spc="-50" dirty="0">
               <a:latin typeface="Aharoni" panose="02010803020104030203" pitchFamily="2" charset="-79"/>

</xml_diff>